<commit_message>
one table to go
</commit_message>
<xml_diff>
--- a/Reports/Manuscript/Figure 1.pptx
+++ b/Reports/Manuscript/Figure 1.pptx
@@ -272,7 +272,7 @@
           <a:p>
             <a:fld id="{1D143431-5B1E-4EA1-9D4D-D1DE64DF6445}" type="datetimeFigureOut">
               <a:rPr lang="en-AU" smtClean="0"/>
-              <a:t>14/08/2023</a:t>
+              <a:t>21/10/2023</a:t>
             </a:fld>
             <a:endParaRPr lang="en-AU"/>
           </a:p>
@@ -540,6 +540,90 @@
 </p:notesMaster>
 </file>
 
+<file path=ppt/notesSlides/notesSlide1.xml><?xml version="1.0" encoding="utf-8"?>
+<p:notes xmlns:a="http://schemas.openxmlformats.org/drawingml/2006/main" xmlns:r="http://schemas.openxmlformats.org/officeDocument/2006/relationships" xmlns:p="http://schemas.openxmlformats.org/presentationml/2006/main">
+  <p:cSld>
+    <p:spTree>
+      <p:nvGrpSpPr>
+        <p:cNvPr id="1" name=""/>
+        <p:cNvGrpSpPr/>
+        <p:nvPr/>
+      </p:nvGrpSpPr>
+      <p:grpSpPr>
+        <a:xfrm>
+          <a:off x="0" y="0"/>
+          <a:ext cx="0" cy="0"/>
+          <a:chOff x="0" y="0"/>
+          <a:chExt cx="0" cy="0"/>
+        </a:xfrm>
+      </p:grpSpPr>
+      <p:sp>
+        <p:nvSpPr>
+          <p:cNvPr id="2" name="Slide Image Placeholder 1"/>
+          <p:cNvSpPr>
+            <a:spLocks noGrp="1" noRot="1" noChangeAspect="1"/>
+          </p:cNvSpPr>
+          <p:nvPr>
+            <p:ph type="sldImg"/>
+          </p:nvPr>
+        </p:nvSpPr>
+        <p:spPr/>
+      </p:sp>
+      <p:sp>
+        <p:nvSpPr>
+          <p:cNvPr id="3" name="Notes Placeholder 2"/>
+          <p:cNvSpPr>
+            <a:spLocks noGrp="1"/>
+          </p:cNvSpPr>
+          <p:nvPr>
+            <p:ph type="body" idx="1"/>
+          </p:nvPr>
+        </p:nvSpPr>
+        <p:spPr/>
+        <p:txBody>
+          <a:bodyPr/>
+          <a:lstStyle/>
+          <a:p>
+            <a:endParaRPr lang="en-AU" dirty="0"/>
+          </a:p>
+        </p:txBody>
+      </p:sp>
+      <p:sp>
+        <p:nvSpPr>
+          <p:cNvPr id="4" name="Slide Number Placeholder 3"/>
+          <p:cNvSpPr>
+            <a:spLocks noGrp="1"/>
+          </p:cNvSpPr>
+          <p:nvPr>
+            <p:ph type="sldNum" sz="quarter" idx="5"/>
+          </p:nvPr>
+        </p:nvSpPr>
+        <p:spPr/>
+        <p:txBody>
+          <a:bodyPr/>
+          <a:lstStyle/>
+          <a:p>
+            <a:fld id="{38A26679-B819-44E8-90F4-468D7F0A9585}" type="slidenum">
+              <a:rPr lang="en-AU" smtClean="0"/>
+              <a:t>1</a:t>
+            </a:fld>
+            <a:endParaRPr lang="en-AU"/>
+          </a:p>
+        </p:txBody>
+      </p:sp>
+    </p:spTree>
+    <p:extLst>
+      <p:ext uri="{BB962C8B-B14F-4D97-AF65-F5344CB8AC3E}">
+        <p14:creationId xmlns:p14="http://schemas.microsoft.com/office/powerpoint/2010/main" val="120488634"/>
+      </p:ext>
+    </p:extLst>
+  </p:cSld>
+  <p:clrMapOvr>
+    <a:masterClrMapping/>
+  </p:clrMapOvr>
+</p:notes>
+</file>
+
 <file path=ppt/slideLayouts/slideLayout1.xml><?xml version="1.0" encoding="utf-8"?>
 <p:sldLayout xmlns:a="http://schemas.openxmlformats.org/drawingml/2006/main" xmlns:r="http://schemas.openxmlformats.org/officeDocument/2006/relationships" xmlns:p="http://schemas.openxmlformats.org/presentationml/2006/main" preserve="1" userDrawn="1">
   <p:cSld name="Title Slide">
@@ -874,7 +958,7 @@
             <a:fld id="{3566A85B-824E-4030-ACFE-EEF7636712AD}" type="datetime1">
               <a:rPr lang="en-AU" smtClean="0"/>
               <a:pPr/>
-              <a:t>14/08/2023</a:t>
+              <a:t>21/10/2023</a:t>
             </a:fld>
             <a:endParaRPr lang="en-AU"/>
           </a:p>
@@ -1179,7 +1263,7 @@
             <a:fld id="{3566A85B-824E-4030-ACFE-EEF7636712AD}" type="datetime1">
               <a:rPr lang="en-AU" smtClean="0"/>
               <a:pPr/>
-              <a:t>14/08/2023</a:t>
+              <a:t>21/10/2023</a:t>
             </a:fld>
             <a:endParaRPr lang="en-AU"/>
           </a:p>
@@ -1515,7 +1599,7 @@
             <a:fld id="{3566A85B-824E-4030-ACFE-EEF7636712AD}" type="datetime1">
               <a:rPr lang="en-AU" smtClean="0"/>
               <a:pPr/>
-              <a:t>14/08/2023</a:t>
+              <a:t>21/10/2023</a:t>
             </a:fld>
             <a:endParaRPr lang="en-AU"/>
           </a:p>
@@ -1659,7 +1743,7 @@
           <a:p>
             <a:fld id="{0AB77E0A-5752-468E-B954-8B5259A96F3F}" type="datetime1">
               <a:rPr lang="en-AU" smtClean="0"/>
-              <a:t>14/08/2023</a:t>
+              <a:t>21/10/2023</a:t>
             </a:fld>
             <a:endParaRPr lang="en-AU"/>
           </a:p>
@@ -1891,7 +1975,7 @@
           <a:p>
             <a:fld id="{826159E0-D9A2-49CD-B9E8-2425E3A4501A}" type="datetime1">
               <a:rPr lang="en-AU" smtClean="0"/>
-              <a:t>14/08/2023</a:t>
+              <a:t>21/10/2023</a:t>
             </a:fld>
             <a:endParaRPr lang="en-AU"/>
           </a:p>
@@ -2158,7 +2242,7 @@
           <a:p>
             <a:fld id="{E9156ADA-AA5A-44F6-BA2C-647618D6B843}" type="datetime1">
               <a:rPr lang="en-AU" smtClean="0"/>
-              <a:t>14/08/2023</a:t>
+              <a:t>21/10/2023</a:t>
             </a:fld>
             <a:endParaRPr lang="en-AU"/>
           </a:p>
@@ -2436,7 +2520,7 @@
           <a:p>
             <a:fld id="{097C4081-DC95-43CD-968A-2951731A3825}" type="datetime1">
               <a:rPr lang="en-AU" smtClean="0"/>
-              <a:t>14/08/2023</a:t>
+              <a:t>21/10/2023</a:t>
             </a:fld>
             <a:endParaRPr lang="en-AU"/>
           </a:p>
@@ -2726,7 +2810,7 @@
           <a:p>
             <a:fld id="{50FDBB5E-92C8-4BF1-AF88-65C92CB8A370}" type="datetime1">
               <a:rPr lang="en-AU" smtClean="0"/>
-              <a:t>14/08/2023</a:t>
+              <a:t>21/10/2023</a:t>
             </a:fld>
             <a:endParaRPr lang="en-AU"/>
           </a:p>
@@ -2977,7 +3061,7 @@
           <a:p>
             <a:fld id="{E9156ADA-AA5A-44F6-BA2C-647618D6B843}" type="datetime1">
               <a:rPr lang="en-AU" smtClean="0"/>
-              <a:t>14/08/2023</a:t>
+              <a:t>21/10/2023</a:t>
             </a:fld>
             <a:endParaRPr lang="en-AU"/>
           </a:p>
@@ -3150,7 +3234,7 @@
           <a:p>
             <a:fld id="{12BFCAFD-78E4-4A90-AE64-7A60A22E4939}" type="datetime1">
               <a:rPr lang="en-AU" smtClean="0"/>
-              <a:t>14/08/2023</a:t>
+              <a:t>21/10/2023</a:t>
             </a:fld>
             <a:endParaRPr lang="en-AU"/>
           </a:p>
@@ -3486,7 +3570,7 @@
           <a:p>
             <a:fld id="{12BFCAFD-78E4-4A90-AE64-7A60A22E4939}" type="datetime1">
               <a:rPr lang="en-AU" smtClean="0"/>
-              <a:t>14/08/2023</a:t>
+              <a:t>21/10/2023</a:t>
             </a:fld>
             <a:endParaRPr lang="en-AU"/>
           </a:p>
@@ -3613,7 +3697,7 @@
           <a:p>
             <a:fld id="{4A9DBF44-3F6C-4AD1-917E-19B03E635302}" type="datetime1">
               <a:rPr lang="en-AU" smtClean="0"/>
-              <a:t>14/08/2023</a:t>
+              <a:t>21/10/2023</a:t>
             </a:fld>
             <a:endParaRPr lang="en-AU"/>
           </a:p>
@@ -3744,7 +3828,7 @@
           <a:p>
             <a:fld id="{12BFCAFD-78E4-4A90-AE64-7A60A22E4939}" type="datetime1">
               <a:rPr lang="en-AU" smtClean="0"/>
-              <a:t>14/08/2023</a:t>
+              <a:t>21/10/2023</a:t>
             </a:fld>
             <a:endParaRPr lang="en-AU"/>
           </a:p>
@@ -8951,7 +9035,7 @@
             <a:fld id="{3566A85B-824E-4030-ACFE-EEF7636712AD}" type="datetime1">
               <a:rPr lang="en-AU" smtClean="0"/>
               <a:pPr/>
-              <a:t>14/08/2023</a:t>
+              <a:t>21/10/2023</a:t>
             </a:fld>
             <a:endParaRPr lang="en-AU"/>
           </a:p>
@@ -9377,7 +9461,7 @@
             <a:fld id="{3566A85B-824E-4030-ACFE-EEF7636712AD}" type="datetime1">
               <a:rPr lang="en-AU" smtClean="0"/>
               <a:pPr/>
-              <a:t>14/08/2023</a:t>
+              <a:t>21/10/2023</a:t>
             </a:fld>
             <a:endParaRPr lang="en-AU"/>
           </a:p>
@@ -9682,7 +9766,7 @@
             <a:fld id="{3566A85B-824E-4030-ACFE-EEF7636712AD}" type="datetime1">
               <a:rPr lang="en-AU" smtClean="0"/>
               <a:pPr/>
-              <a:t>14/08/2023</a:t>
+              <a:t>21/10/2023</a:t>
             </a:fld>
             <a:endParaRPr lang="en-AU"/>
           </a:p>
@@ -9986,7 +10070,7 @@
             <a:fld id="{3566A85B-824E-4030-ACFE-EEF7636712AD}" type="datetime1">
               <a:rPr lang="en-AU" smtClean="0"/>
               <a:pPr/>
-              <a:t>14/08/2023</a:t>
+              <a:t>21/10/2023</a:t>
             </a:fld>
             <a:endParaRPr lang="en-AU"/>
           </a:p>
@@ -10290,7 +10374,7 @@
             <a:fld id="{3566A85B-824E-4030-ACFE-EEF7636712AD}" type="datetime1">
               <a:rPr lang="en-AU" smtClean="0"/>
               <a:pPr/>
-              <a:t>14/08/2023</a:t>
+              <a:t>21/10/2023</a:t>
             </a:fld>
             <a:endParaRPr lang="en-AU"/>
           </a:p>
@@ -10474,7 +10558,7 @@
             <a:fld id="{3566A85B-824E-4030-ACFE-EEF7636712AD}" type="datetime1">
               <a:rPr lang="en-AU" smtClean="0"/>
               <a:pPr/>
-              <a:t>14/08/2023</a:t>
+              <a:t>21/10/2023</a:t>
             </a:fld>
             <a:endParaRPr lang="en-AU"/>
           </a:p>
@@ -10779,7 +10863,7 @@
             <a:fld id="{3566A85B-824E-4030-ACFE-EEF7636712AD}" type="datetime1">
               <a:rPr lang="en-AU" smtClean="0"/>
               <a:pPr/>
-              <a:t>14/08/2023</a:t>
+              <a:t>21/10/2023</a:t>
             </a:fld>
             <a:endParaRPr lang="en-AU"/>
           </a:p>
@@ -10993,7 +11077,7 @@
 <file path=ppt/slideMasters/slideMaster1.xml><?xml version="1.0" encoding="utf-8"?>
 <p:sldMaster xmlns:a="http://schemas.openxmlformats.org/drawingml/2006/main" xmlns:r="http://schemas.openxmlformats.org/officeDocument/2006/relationships" xmlns:p="http://schemas.openxmlformats.org/presentationml/2006/main" preserve="1">
   <p:cSld>
-    <p:bg>
+    <p:bg bwMode="auto">
       <p:bgRef idx="1001">
         <a:schemeClr val="bg1"/>
       </p:bgRef>
@@ -11148,7 +11232,7 @@
             <a:fld id="{3566A85B-824E-4030-ACFE-EEF7636712AD}" type="datetime1">
               <a:rPr lang="en-AU" smtClean="0"/>
               <a:pPr/>
-              <a:t>14/08/2023</a:t>
+              <a:t>21/10/2023</a:t>
             </a:fld>
             <a:endParaRPr lang="en-AU"/>
           </a:p>
@@ -11627,13 +11711,14 @@
             <a:avLst/>
           </a:prstGeom>
           <a:solidFill>
-            <a:schemeClr val="accent5">
-              <a:lumMod val="20000"/>
-              <a:lumOff val="80000"/>
+            <a:schemeClr val="bg1">
+              <a:lumMod val="95000"/>
             </a:schemeClr>
           </a:solidFill>
           <a:ln>
-            <a:noFill/>
+            <a:solidFill>
+              <a:schemeClr val="tx1"/>
+            </a:solidFill>
           </a:ln>
         </p:spPr>
         <p:style>
@@ -11679,17 +11764,21 @@
         </p:nvSpPr>
         <p:spPr>
           <a:xfrm>
-            <a:off x="49306" y="146344"/>
-            <a:ext cx="7023538" cy="3045482"/>
+            <a:off x="104528" y="146344"/>
+            <a:ext cx="6968316" cy="3045482"/>
           </a:xfrm>
           <a:prstGeom prst="roundRect">
             <a:avLst/>
           </a:prstGeom>
           <a:solidFill>
-            <a:schemeClr val="accent3"/>
+            <a:schemeClr val="bg1">
+              <a:lumMod val="95000"/>
+            </a:schemeClr>
           </a:solidFill>
           <a:ln>
-            <a:noFill/>
+            <a:solidFill>
+              <a:schemeClr val="tx1"/>
+            </a:solidFill>
           </a:ln>
         </p:spPr>
         <p:style>
@@ -11742,10 +11831,14 @@
             <a:avLst/>
           </a:prstGeom>
           <a:solidFill>
-            <a:schemeClr val="accent3"/>
+            <a:schemeClr val="bg1">
+              <a:lumMod val="95000"/>
+            </a:schemeClr>
           </a:solidFill>
           <a:ln>
-            <a:noFill/>
+            <a:solidFill>
+              <a:schemeClr val="tx1"/>
+            </a:solidFill>
           </a:ln>
         </p:spPr>
         <p:style>
@@ -11811,7 +11904,7 @@
                   <a:schemeClr val="tx2"/>
                 </a:solidFill>
               </a:rPr>
-              <a:t>Data</a:t>
+              <a:t>Datasets</a:t>
             </a:r>
           </a:p>
         </p:txBody>
@@ -11830,8 +11923,8 @@
         </p:nvSpPr>
         <p:spPr>
           <a:xfrm>
-            <a:off x="3172213" y="2741669"/>
-            <a:ext cx="1014111" cy="341504"/>
+            <a:off x="2834320" y="2816464"/>
+            <a:ext cx="1695034" cy="341504"/>
           </a:xfrm>
           <a:prstGeom prst="rect">
             <a:avLst/>
@@ -11846,7 +11939,7 @@
           <a:p>
             <a:r>
               <a:rPr lang="en-AU" b="1" dirty="0"/>
-              <a:t>CHEMs</a:t>
+              <a:t>CHEM Modules</a:t>
             </a:r>
           </a:p>
         </p:txBody>
@@ -11865,8 +11958,8 @@
         </p:nvSpPr>
         <p:spPr>
           <a:xfrm>
-            <a:off x="7438896" y="3299404"/>
-            <a:ext cx="1458309" cy="341504"/>
+            <a:off x="7439975" y="3115969"/>
+            <a:ext cx="1458309" cy="590675"/>
           </a:xfrm>
           <a:prstGeom prst="rect">
             <a:avLst/>
@@ -11882,7 +11975,7 @@
             <a:pPr algn="ctr"/>
             <a:r>
               <a:rPr lang="en-AU" b="1" dirty="0"/>
-              <a:t>Analyses</a:t>
+              <a:t>Analysis programs</a:t>
             </a:r>
           </a:p>
         </p:txBody>
@@ -11900,13 +11993,22 @@
           <p:nvPr/>
         </p:nvSpPr>
         <p:spPr>
-          <a:xfrm rot="17907172" flipH="1">
-            <a:off x="7544878" y="95410"/>
-            <a:ext cx="363276" cy="1140712"/>
+          <a:xfrm rot="17425695" flipH="1">
+            <a:off x="7576424" y="-87280"/>
+            <a:ext cx="463086" cy="1432367"/>
           </a:xfrm>
           <a:prstGeom prst="curvedRightArrow">
-            <a:avLst/>
+            <a:avLst>
+              <a:gd name="adj1" fmla="val 25000"/>
+              <a:gd name="adj2" fmla="val 50000"/>
+              <a:gd name="adj3" fmla="val 47264"/>
+            </a:avLst>
           </a:prstGeom>
+          <a:solidFill>
+            <a:schemeClr val="bg1">
+              <a:lumMod val="75000"/>
+            </a:schemeClr>
+          </a:solidFill>
           <a:ln>
             <a:noFill/>
           </a:ln>
@@ -11960,6 +12062,18 @@
           <a:prstGeom prst="rect">
             <a:avLst/>
           </a:prstGeom>
+          <a:solidFill>
+            <a:schemeClr val="bg1">
+              <a:lumMod val="50000"/>
+            </a:schemeClr>
+          </a:solidFill>
+          <a:ln>
+            <a:solidFill>
+              <a:schemeClr val="bg1">
+                <a:lumMod val="50000"/>
+              </a:schemeClr>
+            </a:solidFill>
+          </a:ln>
         </p:spPr>
         <p:style>
           <a:lnRef idx="2">
@@ -12007,17 +12121,11 @@
             <a:avLst/>
           </a:prstGeom>
           <a:solidFill>
-            <a:schemeClr val="tx2">
-              <a:lumMod val="50000"/>
-              <a:lumOff val="50000"/>
-            </a:schemeClr>
+            <a:schemeClr val="tx1"/>
           </a:solidFill>
           <a:ln>
             <a:solidFill>
-              <a:schemeClr val="tx2">
-                <a:lumMod val="50000"/>
-                <a:lumOff val="50000"/>
-              </a:schemeClr>
+              <a:schemeClr val="tx1"/>
             </a:solidFill>
           </a:ln>
         </p:spPr>
@@ -12067,7 +12175,7 @@
         </p:nvSpPr>
         <p:spPr>
           <a:xfrm>
-            <a:off x="5945142" y="4746772"/>
+            <a:off x="5938235" y="4769069"/>
             <a:ext cx="2269218" cy="307777"/>
           </a:xfrm>
           <a:prstGeom prst="rect">
@@ -12083,7 +12191,7 @@
           <a:p>
             <a:r>
               <a:rPr lang="en-AU" sz="1400" dirty="0"/>
-              <a:t>Type of inputs and outputs</a:t>
+              <a:t>Inputs and outputs</a:t>
             </a:r>
           </a:p>
         </p:txBody>
@@ -12103,9 +12211,9 @@
           <p:nvPr/>
         </p:nvCxnSpPr>
         <p:spPr>
-          <a:xfrm rot="16200000" flipH="1">
-            <a:off x="1126129" y="1265293"/>
-            <a:ext cx="615052" cy="278870"/>
+          <a:xfrm>
+            <a:off x="1728552" y="1903843"/>
+            <a:ext cx="655494" cy="403663"/>
           </a:xfrm>
           <a:prstGeom prst="curvedConnector3">
             <a:avLst>
@@ -12113,6 +12221,11 @@
             </a:avLst>
           </a:prstGeom>
           <a:ln>
+            <a:solidFill>
+              <a:schemeClr val="bg1">
+                <a:lumMod val="75000"/>
+              </a:schemeClr>
+            </a:solidFill>
             <a:tailEnd type="triangle"/>
           </a:ln>
         </p:spPr>
@@ -12142,18 +12255,27 @@
           </p:cNvPr>
           <p:cNvCxnSpPr>
             <a:cxnSpLocks/>
+            <a:stCxn id="43" idx="1"/>
+            <a:endCxn id="24" idx="3"/>
           </p:cNvCxnSpPr>
           <p:nvPr/>
         </p:nvCxnSpPr>
         <p:spPr>
-          <a:xfrm rot="5400000" flipH="1" flipV="1">
-            <a:off x="435555" y="1271805"/>
-            <a:ext cx="615052" cy="278870"/>
+          <a:xfrm rot="10800000" flipV="1">
+            <a:off x="1771841" y="1020726"/>
+            <a:ext cx="625088" cy="527900"/>
           </a:xfrm>
           <a:prstGeom prst="curvedConnector3">
-            <a:avLst/>
+            <a:avLst>
+              <a:gd name="adj1" fmla="val 50000"/>
+            </a:avLst>
           </a:prstGeom>
           <a:ln>
+            <a:solidFill>
+              <a:schemeClr val="bg1">
+                <a:lumMod val="75000"/>
+              </a:schemeClr>
+            </a:solidFill>
             <a:tailEnd type="triangle"/>
           </a:ln>
         </p:spPr>
@@ -12183,14 +12305,13 @@
           </p:cNvPr>
           <p:cNvCxnSpPr>
             <a:cxnSpLocks/>
-            <a:endCxn id="24" idx="1"/>
           </p:cNvCxnSpPr>
           <p:nvPr/>
         </p:nvCxnSpPr>
         <p:spPr>
-          <a:xfrm>
-            <a:off x="1911418" y="700203"/>
-            <a:ext cx="900025" cy="6350"/>
+          <a:xfrm rot="16200000" flipV="1">
+            <a:off x="2855783" y="1509640"/>
+            <a:ext cx="356888" cy="105482"/>
           </a:xfrm>
           <a:prstGeom prst="curvedConnector3">
             <a:avLst>
@@ -12198,6 +12319,11 @@
             </a:avLst>
           </a:prstGeom>
           <a:ln>
+            <a:solidFill>
+              <a:schemeClr val="bg1">
+                <a:lumMod val="75000"/>
+              </a:schemeClr>
+            </a:solidFill>
             <a:tailEnd type="triangle"/>
           </a:ln>
         </p:spPr>
@@ -12230,14 +12356,16 @@
         </p:nvSpPr>
         <p:spPr>
           <a:xfrm>
-            <a:off x="279252" y="342913"/>
+            <a:off x="4547638" y="317538"/>
             <a:ext cx="1534866" cy="727280"/>
           </a:xfrm>
           <a:prstGeom prst="roundRect">
             <a:avLst/>
           </a:prstGeom>
           <a:solidFill>
-            <a:schemeClr val="accent1"/>
+            <a:schemeClr val="bg1">
+              <a:lumMod val="50000"/>
+            </a:schemeClr>
           </a:solidFill>
           <a:ln>
             <a:noFill/>
@@ -12266,11 +12394,7 @@
             <a:pPr algn="ctr"/>
             <a:r>
               <a:rPr lang="en-US" sz="1200" b="1" dirty="0"/>
-              <a:t>Determinants</a:t>
-            </a:r>
-            <a:r>
-              <a:rPr lang="en-US" sz="1200" dirty="0"/>
-              <a:t> of health and ill-health</a:t>
+              <a:t>Determinants of health and ill-health</a:t>
             </a:r>
           </a:p>
         </p:txBody>
@@ -12287,16 +12411,18 @@
           <p:cNvSpPr/>
           <p:nvPr/>
         </p:nvSpPr>
-        <p:spPr>
-          <a:xfrm>
-            <a:off x="2811443" y="342913"/>
+        <p:spPr bwMode="blackGray">
+          <a:xfrm>
+            <a:off x="236975" y="1184986"/>
             <a:ext cx="1534866" cy="727280"/>
           </a:xfrm>
           <a:prstGeom prst="roundRect">
             <a:avLst/>
           </a:prstGeom>
           <a:solidFill>
-            <a:schemeClr val="accent1"/>
+            <a:schemeClr val="bg1">
+              <a:lumMod val="50000"/>
+            </a:schemeClr>
           </a:solidFill>
           <a:ln>
             <a:noFill/>
@@ -12325,11 +12451,7 @@
             <a:pPr algn="ctr"/>
             <a:r>
               <a:rPr lang="en-US" sz="1200" b="1" dirty="0"/>
-              <a:t>Demand</a:t>
-            </a:r>
-            <a:r>
-              <a:rPr lang="en-US" sz="1200" dirty="0"/>
-              <a:t> for health &amp; healthcare</a:t>
+              <a:t>Demand for health &amp; healthcare</a:t>
             </a:r>
           </a:p>
         </p:txBody>
@@ -12348,14 +12470,16 @@
         </p:nvSpPr>
         <p:spPr>
           <a:xfrm>
-            <a:off x="5384834" y="342913"/>
+            <a:off x="2384047" y="1774683"/>
             <a:ext cx="1534866" cy="727280"/>
           </a:xfrm>
           <a:prstGeom prst="roundRect">
             <a:avLst/>
           </a:prstGeom>
           <a:solidFill>
-            <a:schemeClr val="accent1"/>
+            <a:schemeClr val="bg1">
+              <a:lumMod val="50000"/>
+            </a:schemeClr>
           </a:solidFill>
           <a:ln>
             <a:noFill/>
@@ -12384,11 +12508,7 @@
             <a:pPr algn="ctr"/>
             <a:r>
               <a:rPr lang="en-US" sz="1200" b="1" dirty="0"/>
-              <a:t>Supply</a:t>
-            </a:r>
-            <a:r>
-              <a:rPr lang="en-US" sz="1200" dirty="0"/>
-              <a:t> of health services</a:t>
+              <a:t>Supply of health services</a:t>
             </a:r>
           </a:p>
         </p:txBody>
@@ -12404,20 +12524,24 @@
           </p:cNvPr>
           <p:cNvCxnSpPr>
             <a:cxnSpLocks/>
+            <a:endCxn id="21" idx="3"/>
           </p:cNvCxnSpPr>
           <p:nvPr/>
         </p:nvCxnSpPr>
         <p:spPr>
-          <a:xfrm flipV="1">
-            <a:off x="4435462" y="827099"/>
-            <a:ext cx="899937" cy="185260"/>
-          </a:xfrm>
-          <a:prstGeom prst="curvedConnector3">
-            <a:avLst>
-              <a:gd name="adj1" fmla="val 50000"/>
-            </a:avLst>
+          <a:xfrm rot="16200000" flipV="1">
+            <a:off x="6066549" y="697134"/>
+            <a:ext cx="544805" cy="512894"/>
+          </a:xfrm>
+          <a:prstGeom prst="curvedConnector2">
+            <a:avLst/>
           </a:prstGeom>
           <a:ln>
+            <a:solidFill>
+              <a:schemeClr val="bg1">
+                <a:lumMod val="75000"/>
+              </a:schemeClr>
+            </a:solidFill>
             <a:tailEnd type="triangle"/>
           </a:ln>
         </p:spPr>
@@ -12447,20 +12571,24 @@
           </p:cNvPr>
           <p:cNvCxnSpPr>
             <a:cxnSpLocks/>
+            <a:endCxn id="44" idx="3"/>
           </p:cNvCxnSpPr>
           <p:nvPr/>
         </p:nvCxnSpPr>
         <p:spPr>
-          <a:xfrm rot="10800000">
-            <a:off x="4427318" y="496687"/>
-            <a:ext cx="932798" cy="182235"/>
-          </a:xfrm>
-          <a:prstGeom prst="curvedConnector3">
-            <a:avLst>
-              <a:gd name="adj1" fmla="val 50000"/>
-            </a:avLst>
+          <a:xfrm rot="5400000">
+            <a:off x="6113269" y="2055091"/>
+            <a:ext cx="553165" cy="487009"/>
+          </a:xfrm>
+          <a:prstGeom prst="curvedConnector2">
+            <a:avLst/>
           </a:prstGeom>
           <a:ln>
+            <a:solidFill>
+              <a:schemeClr val="bg1">
+                <a:lumMod val="75000"/>
+              </a:schemeClr>
+            </a:solidFill>
             <a:tailEnd type="triangle"/>
           </a:ln>
         </p:spPr>
@@ -12493,14 +12621,16 @@
         </p:nvSpPr>
         <p:spPr>
           <a:xfrm>
-            <a:off x="279252" y="1733247"/>
+            <a:off x="5452854" y="1278929"/>
             <a:ext cx="1534866" cy="727280"/>
           </a:xfrm>
           <a:prstGeom prst="roundRect">
             <a:avLst/>
           </a:prstGeom>
           <a:solidFill>
-            <a:schemeClr val="accent1"/>
+            <a:schemeClr val="bg1">
+              <a:lumMod val="50000"/>
+            </a:schemeClr>
           </a:solidFill>
           <a:ln>
             <a:noFill/>
@@ -12549,14 +12679,16 @@
         </p:nvSpPr>
         <p:spPr>
           <a:xfrm>
-            <a:off x="2793642" y="1736971"/>
+            <a:off x="2396929" y="657086"/>
             <a:ext cx="1534866" cy="727280"/>
           </a:xfrm>
           <a:prstGeom prst="roundRect">
             <a:avLst/>
           </a:prstGeom>
           <a:solidFill>
-            <a:schemeClr val="accent1"/>
+            <a:schemeClr val="bg1">
+              <a:lumMod val="50000"/>
+            </a:schemeClr>
           </a:solidFill>
           <a:ln>
             <a:noFill/>
@@ -12584,14 +12716,9 @@
           <a:p>
             <a:pPr algn="ctr"/>
             <a:r>
-              <a:rPr lang="en-US" sz="1200" dirty="0"/>
-              <a:t>Health and its </a:t>
-            </a:r>
-            <a:r>
               <a:rPr lang="en-US" sz="1200" b="1" dirty="0"/>
-              <a:t>value</a:t>
-            </a:r>
-            <a:endParaRPr lang="en-US" sz="1200" dirty="0"/>
+              <a:t>Health and its value</a:t>
+            </a:r>
           </a:p>
         </p:txBody>
       </p:sp>
@@ -12609,14 +12736,16 @@
         </p:nvSpPr>
         <p:spPr>
           <a:xfrm>
-            <a:off x="5442440" y="1729818"/>
+            <a:off x="4611480" y="2211538"/>
             <a:ext cx="1534866" cy="727280"/>
           </a:xfrm>
           <a:prstGeom prst="roundRect">
             <a:avLst/>
           </a:prstGeom>
           <a:solidFill>
-            <a:schemeClr val="accent1"/>
+            <a:schemeClr val="bg1">
+              <a:lumMod val="50000"/>
+            </a:schemeClr>
           </a:solidFill>
           <a:ln>
             <a:noFill/>
@@ -12669,13 +12798,15 @@
           </p:cNvPr>
           <p:cNvCxnSpPr>
             <a:cxnSpLocks/>
+            <a:stCxn id="38" idx="1"/>
+            <a:endCxn id="28" idx="3"/>
           </p:cNvCxnSpPr>
           <p:nvPr/>
         </p:nvCxnSpPr>
         <p:spPr>
-          <a:xfrm>
-            <a:off x="1883510" y="2226152"/>
-            <a:ext cx="900025" cy="6350"/>
+          <a:xfrm rot="10800000" flipV="1">
+            <a:off x="3918914" y="1642569"/>
+            <a:ext cx="1533941" cy="495754"/>
           </a:xfrm>
           <a:prstGeom prst="curvedConnector3">
             <a:avLst>
@@ -12683,6 +12814,11 @@
             </a:avLst>
           </a:prstGeom>
           <a:ln>
+            <a:solidFill>
+              <a:schemeClr val="bg1">
+                <a:lumMod val="75000"/>
+              </a:schemeClr>
+            </a:solidFill>
             <a:tailEnd type="triangle"/>
           </a:ln>
         </p:spPr>
@@ -12716,9 +12852,9 @@
           <p:nvPr/>
         </p:nvCxnSpPr>
         <p:spPr>
-          <a:xfrm rot="5400000" flipH="1" flipV="1">
-            <a:off x="3348801" y="1370003"/>
-            <a:ext cx="512544" cy="7025"/>
+          <a:xfrm rot="10800000">
+            <a:off x="3931921" y="1043940"/>
+            <a:ext cx="1520829" cy="525700"/>
           </a:xfrm>
           <a:prstGeom prst="curvedConnector3">
             <a:avLst>
@@ -12726,6 +12862,11 @@
             </a:avLst>
           </a:prstGeom>
           <a:ln>
+            <a:solidFill>
+              <a:schemeClr val="bg1">
+                <a:lumMod val="75000"/>
+              </a:schemeClr>
+            </a:solidFill>
             <a:tailEnd type="triangle"/>
           </a:ln>
         </p:spPr>
@@ -12759,9 +12900,9 @@
           <p:nvPr/>
         </p:nvCxnSpPr>
         <p:spPr>
-          <a:xfrm rot="5400000" flipH="1" flipV="1">
-            <a:off x="5903019" y="1393502"/>
-            <a:ext cx="512544" cy="0"/>
+          <a:xfrm rot="10800000">
+            <a:off x="3918913" y="2229670"/>
+            <a:ext cx="686204" cy="325651"/>
           </a:xfrm>
           <a:prstGeom prst="curvedConnector3">
             <a:avLst>
@@ -12769,6 +12910,11 @@
             </a:avLst>
           </a:prstGeom>
           <a:ln>
+            <a:solidFill>
+              <a:schemeClr val="bg1">
+                <a:lumMod val="75000"/>
+              </a:schemeClr>
+            </a:solidFill>
             <a:tailEnd type="triangle"/>
           </a:ln>
         </p:spPr>
@@ -12808,7 +12954,9 @@
             <a:avLst/>
           </a:prstGeom>
           <a:solidFill>
-            <a:schemeClr val="accent1"/>
+            <a:schemeClr val="bg1">
+              <a:lumMod val="50000"/>
+            </a:schemeClr>
           </a:solidFill>
           <a:ln>
             <a:noFill/>
@@ -12836,12 +12984,8 @@
           <a:p>
             <a:pPr algn="ctr"/>
             <a:r>
-              <a:rPr lang="en-US" sz="1200" dirty="0"/>
-              <a:t>Economic </a:t>
-            </a:r>
-            <a:r>
               <a:rPr lang="en-US" sz="1200" b="1" dirty="0"/>
-              <a:t>evaluation</a:t>
+              <a:t>Economic evaluation</a:t>
             </a:r>
           </a:p>
         </p:txBody>
@@ -12860,14 +13004,16 @@
         </p:nvSpPr>
         <p:spPr>
           <a:xfrm>
-            <a:off x="7380917" y="2397009"/>
+            <a:off x="7415448" y="2282388"/>
             <a:ext cx="1534866" cy="727280"/>
           </a:xfrm>
           <a:prstGeom prst="roundRect">
             <a:avLst/>
           </a:prstGeom>
           <a:solidFill>
-            <a:schemeClr val="accent1"/>
+            <a:schemeClr val="bg1">
+              <a:lumMod val="50000"/>
+            </a:schemeClr>
           </a:solidFill>
           <a:ln>
             <a:noFill/>
@@ -12922,10 +13068,7 @@
             <a:avLst/>
           </a:prstGeom>
           <a:solidFill>
-            <a:schemeClr val="accent4">
-              <a:lumMod val="50000"/>
-              <a:lumOff val="50000"/>
-            </a:schemeClr>
+            <a:schemeClr val="tx1"/>
           </a:solidFill>
           <a:ln>
             <a:noFill/>
@@ -12980,10 +13123,7 @@
             <a:avLst/>
           </a:prstGeom>
           <a:solidFill>
-            <a:schemeClr val="accent4">
-              <a:lumMod val="50000"/>
-              <a:lumOff val="50000"/>
-            </a:schemeClr>
+            <a:schemeClr val="tx1"/>
           </a:solidFill>
           <a:ln>
             <a:noFill/>
@@ -13012,7 +13152,7 @@
             <a:pPr algn="ctr"/>
             <a:r>
               <a:rPr lang="en-US" sz="1200" b="1" dirty="0"/>
-              <a:t>Fake</a:t>
+              <a:t>Toy</a:t>
             </a:r>
           </a:p>
         </p:txBody>
@@ -13030,13 +13170,22 @@
           <p:nvPr/>
         </p:nvSpPr>
         <p:spPr>
-          <a:xfrm rot="15617972" flipH="1">
-            <a:off x="6187254" y="2710003"/>
-            <a:ext cx="515389" cy="1723259"/>
+          <a:xfrm rot="15621021" flipH="1">
+            <a:off x="6232596" y="2553957"/>
+            <a:ext cx="420212" cy="1860087"/>
           </a:xfrm>
           <a:prstGeom prst="curvedRightArrow">
-            <a:avLst/>
+            <a:avLst>
+              <a:gd name="adj1" fmla="val 25000"/>
+              <a:gd name="adj2" fmla="val 85156"/>
+              <a:gd name="adj3" fmla="val 25000"/>
+            </a:avLst>
           </a:prstGeom>
+          <a:solidFill>
+            <a:schemeClr val="bg1">
+              <a:lumMod val="75000"/>
+            </a:schemeClr>
+          </a:solidFill>
           <a:ln>
             <a:noFill/>
           </a:ln>
@@ -13084,12 +13233,17 @@
         </p:nvSpPr>
         <p:spPr>
           <a:xfrm rot="4658935" flipH="1">
-            <a:off x="6520907" y="3226882"/>
+            <a:off x="6409756" y="3213624"/>
             <a:ext cx="564296" cy="2335972"/>
           </a:xfrm>
           <a:prstGeom prst="curvedRightArrow">
             <a:avLst/>
           </a:prstGeom>
+          <a:solidFill>
+            <a:schemeClr val="bg1">
+              <a:lumMod val="75000"/>
+            </a:schemeClr>
+          </a:solidFill>
           <a:ln>
             <a:noFill/>
           </a:ln>
@@ -13153,7 +13307,7 @@
           <a:p>
             <a:r>
               <a:rPr lang="en-AU" sz="1400" dirty="0"/>
-              <a:t>Domains of health economics (Wagstaff &amp; </a:t>
+              <a:t>Health economic domains (Wagstaff &amp; </a:t>
             </a:r>
             <a:r>
               <a:rPr lang="en-AU" sz="1400" dirty="0" err="1"/>
@@ -13166,6 +13320,244 @@
           </a:p>
         </p:txBody>
       </p:sp>
+      <p:cxnSp>
+        <p:nvCxnSpPr>
+          <p:cNvPr id="61" name="Curved Connector 19">
+            <a:extLst>
+              <a:ext uri="{FF2B5EF4-FFF2-40B4-BE49-F238E27FC236}">
+                <a16:creationId xmlns:a16="http://schemas.microsoft.com/office/drawing/2014/main" id="{24A63E31-333D-4CFE-A6E9-5FC7174D1225}"/>
+              </a:ext>
+            </a:extLst>
+          </p:cNvPr>
+          <p:cNvCxnSpPr>
+            <a:cxnSpLocks/>
+          </p:cNvCxnSpPr>
+          <p:nvPr/>
+        </p:nvCxnSpPr>
+        <p:spPr>
+          <a:xfrm rot="10800000" flipV="1">
+            <a:off x="3931795" y="701851"/>
+            <a:ext cx="591382" cy="246902"/>
+          </a:xfrm>
+          <a:prstGeom prst="curvedConnector3">
+            <a:avLst>
+              <a:gd name="adj1" fmla="val 50000"/>
+            </a:avLst>
+          </a:prstGeom>
+          <a:ln>
+            <a:solidFill>
+              <a:schemeClr val="bg1">
+                <a:lumMod val="75000"/>
+              </a:schemeClr>
+            </a:solidFill>
+            <a:tailEnd type="triangle"/>
+          </a:ln>
+        </p:spPr>
+        <p:style>
+          <a:lnRef idx="3">
+            <a:schemeClr val="accent1"/>
+          </a:lnRef>
+          <a:fillRef idx="0">
+            <a:schemeClr val="accent1"/>
+          </a:fillRef>
+          <a:effectRef idx="2">
+            <a:schemeClr val="accent1"/>
+          </a:effectRef>
+          <a:fontRef idx="minor">
+            <a:schemeClr val="tx1"/>
+          </a:fontRef>
+        </p:style>
+      </p:cxnSp>
+      <p:cxnSp>
+        <p:nvCxnSpPr>
+          <p:cNvPr id="66" name="Curved Connector 22">
+            <a:extLst>
+              <a:ext uri="{FF2B5EF4-FFF2-40B4-BE49-F238E27FC236}">
+                <a16:creationId xmlns:a16="http://schemas.microsoft.com/office/drawing/2014/main" id="{E87ED498-F7C3-4496-A164-60575C9F776C}"/>
+              </a:ext>
+            </a:extLst>
+          </p:cNvPr>
+          <p:cNvCxnSpPr>
+            <a:cxnSpLocks/>
+          </p:cNvCxnSpPr>
+          <p:nvPr/>
+        </p:nvCxnSpPr>
+        <p:spPr>
+          <a:xfrm rot="10800000">
+            <a:off x="1748760" y="1658043"/>
+            <a:ext cx="616973" cy="445181"/>
+          </a:xfrm>
+          <a:prstGeom prst="curvedConnector3">
+            <a:avLst>
+              <a:gd name="adj1" fmla="val 50000"/>
+            </a:avLst>
+          </a:prstGeom>
+          <a:ln>
+            <a:solidFill>
+              <a:schemeClr val="bg1">
+                <a:lumMod val="75000"/>
+              </a:schemeClr>
+            </a:solidFill>
+            <a:tailEnd type="triangle"/>
+          </a:ln>
+        </p:spPr>
+        <p:style>
+          <a:lnRef idx="3">
+            <a:schemeClr val="accent1"/>
+          </a:lnRef>
+          <a:fillRef idx="0">
+            <a:schemeClr val="accent1"/>
+          </a:fillRef>
+          <a:effectRef idx="2">
+            <a:schemeClr val="accent1"/>
+          </a:effectRef>
+          <a:fontRef idx="minor">
+            <a:schemeClr val="tx1"/>
+          </a:fontRef>
+        </p:style>
+      </p:cxnSp>
+      <p:cxnSp>
+        <p:nvCxnSpPr>
+          <p:cNvPr id="86" name="Curved Connector 2">
+            <a:extLst>
+              <a:ext uri="{FF2B5EF4-FFF2-40B4-BE49-F238E27FC236}">
+                <a16:creationId xmlns:a16="http://schemas.microsoft.com/office/drawing/2014/main" id="{6FC4EF2A-DECB-40E2-880B-258E80B7DE72}"/>
+              </a:ext>
+            </a:extLst>
+          </p:cNvPr>
+          <p:cNvCxnSpPr>
+            <a:cxnSpLocks/>
+          </p:cNvCxnSpPr>
+          <p:nvPr/>
+        </p:nvCxnSpPr>
+        <p:spPr>
+          <a:xfrm flipV="1">
+            <a:off x="1797550" y="826269"/>
+            <a:ext cx="608821" cy="453904"/>
+          </a:xfrm>
+          <a:prstGeom prst="curvedConnector3">
+            <a:avLst>
+              <a:gd name="adj1" fmla="val 50000"/>
+            </a:avLst>
+          </a:prstGeom>
+          <a:ln>
+            <a:solidFill>
+              <a:schemeClr val="bg1">
+                <a:lumMod val="75000"/>
+              </a:schemeClr>
+            </a:solidFill>
+            <a:tailEnd type="triangle"/>
+          </a:ln>
+        </p:spPr>
+        <p:style>
+          <a:lnRef idx="3">
+            <a:schemeClr val="accent1"/>
+          </a:lnRef>
+          <a:fillRef idx="0">
+            <a:schemeClr val="accent1"/>
+          </a:fillRef>
+          <a:effectRef idx="2">
+            <a:schemeClr val="accent1"/>
+          </a:effectRef>
+          <a:fontRef idx="minor">
+            <a:schemeClr val="tx1"/>
+          </a:fontRef>
+        </p:style>
+      </p:cxnSp>
+      <p:cxnSp>
+        <p:nvCxnSpPr>
+          <p:cNvPr id="97" name="Curved Connector 51">
+            <a:extLst>
+              <a:ext uri="{FF2B5EF4-FFF2-40B4-BE49-F238E27FC236}">
+                <a16:creationId xmlns:a16="http://schemas.microsoft.com/office/drawing/2014/main" id="{5E3E4596-B235-448F-9F79-8526F2D74B3A}"/>
+              </a:ext>
+            </a:extLst>
+          </p:cNvPr>
+          <p:cNvCxnSpPr>
+            <a:cxnSpLocks/>
+            <a:endCxn id="24" idx="0"/>
+          </p:cNvCxnSpPr>
+          <p:nvPr/>
+        </p:nvCxnSpPr>
+        <p:spPr>
+          <a:xfrm rot="10800000" flipV="1">
+            <a:off x="1004409" y="437802"/>
+            <a:ext cx="3515913" cy="747184"/>
+          </a:xfrm>
+          <a:prstGeom prst="curvedConnector2">
+            <a:avLst/>
+          </a:prstGeom>
+          <a:ln>
+            <a:solidFill>
+              <a:schemeClr val="bg1">
+                <a:lumMod val="75000"/>
+              </a:schemeClr>
+            </a:solidFill>
+            <a:tailEnd type="triangle"/>
+          </a:ln>
+        </p:spPr>
+        <p:style>
+          <a:lnRef idx="3">
+            <a:schemeClr val="accent1"/>
+          </a:lnRef>
+          <a:fillRef idx="0">
+            <a:schemeClr val="accent1"/>
+          </a:fillRef>
+          <a:effectRef idx="2">
+            <a:schemeClr val="accent1"/>
+          </a:effectRef>
+          <a:fontRef idx="minor">
+            <a:schemeClr val="tx1"/>
+          </a:fontRef>
+        </p:style>
+      </p:cxnSp>
+      <p:cxnSp>
+        <p:nvCxnSpPr>
+          <p:cNvPr id="123" name="Curved Connector 51">
+            <a:extLst>
+              <a:ext uri="{FF2B5EF4-FFF2-40B4-BE49-F238E27FC236}">
+                <a16:creationId xmlns:a16="http://schemas.microsoft.com/office/drawing/2014/main" id="{4801583D-0534-425C-885C-02B0A48607A6}"/>
+              </a:ext>
+            </a:extLst>
+          </p:cNvPr>
+          <p:cNvCxnSpPr>
+            <a:cxnSpLocks/>
+            <a:endCxn id="24" idx="2"/>
+          </p:cNvCxnSpPr>
+          <p:nvPr/>
+        </p:nvCxnSpPr>
+        <p:spPr>
+          <a:xfrm rot="10800000">
+            <a:off x="1004408" y="1912266"/>
+            <a:ext cx="3566008" cy="841548"/>
+          </a:xfrm>
+          <a:prstGeom prst="curvedConnector2">
+            <a:avLst/>
+          </a:prstGeom>
+          <a:ln>
+            <a:solidFill>
+              <a:schemeClr val="bg1">
+                <a:lumMod val="75000"/>
+              </a:schemeClr>
+            </a:solidFill>
+            <a:tailEnd type="triangle"/>
+          </a:ln>
+        </p:spPr>
+        <p:style>
+          <a:lnRef idx="3">
+            <a:schemeClr val="accent1"/>
+          </a:lnRef>
+          <a:fillRef idx="0">
+            <a:schemeClr val="accent1"/>
+          </a:fillRef>
+          <a:effectRef idx="2">
+            <a:schemeClr val="accent1"/>
+          </a:effectRef>
+          <a:fontRef idx="minor">
+            <a:schemeClr val="tx1"/>
+          </a:fontRef>
+        </p:style>
+      </p:cxnSp>
     </p:spTree>
     <p:extLst>
       <p:ext uri="{BB962C8B-B14F-4D97-AF65-F5344CB8AC3E}">
@@ -13732,15 +14124,6 @@
 </file>
 
 <file path=customXml/item1.xml><?xml version="1.0" encoding="utf-8"?>
-<?mso-contentType ?>
-<FormTemplates xmlns="http://schemas.microsoft.com/sharepoint/v3/contenttype/forms">
-  <Display>DocumentLibraryForm</Display>
-  <Edit>DocumentLibraryForm</Edit>
-  <New>DocumentLibraryForm</New>
-</FormTemplates>
-</file>
-
-<file path=customXml/item2.xml><?xml version="1.0" encoding="utf-8"?>
 <ct:contentTypeSchema xmlns:ct="http://schemas.microsoft.com/office/2006/metadata/contentType" xmlns:ma="http://schemas.microsoft.com/office/2006/metadata/properties/metaAttributes" ct:_="" ma:_="" ma:contentTypeName="Document" ma:contentTypeID="0x010100B5DB2B4285061047A82B278F75EFB6AC" ma:contentTypeVersion="12" ma:contentTypeDescription="Create a new document." ma:contentTypeScope="" ma:versionID="8586775b3ba77d16f61122d1c4fa41aa">
   <xsd:schema xmlns:xsd="http://www.w3.org/2001/XMLSchema" xmlns:xs="http://www.w3.org/2001/XMLSchema" xmlns:p="http://schemas.microsoft.com/office/2006/metadata/properties" xmlns:ns3="f7f3860d-0d6f-4c7a-8485-5e6e27e7767e" xmlns:ns4="c2ee7ecd-289c-457b-a16e-1307d41712cb" targetNamespace="http://schemas.microsoft.com/office/2006/metadata/properties" ma:root="true" ma:fieldsID="0260201f4cfa0cfd0f69079252327cf3" ns3:_="" ns4:_="">
     <xsd:import namespace="f7f3860d-0d6f-4c7a-8485-5e6e27e7767e"/>
@@ -13957,6 +14340,15 @@
 </ct:contentTypeSchema>
 </file>
 
+<file path=customXml/item2.xml><?xml version="1.0" encoding="utf-8"?>
+<?mso-contentType ?>
+<FormTemplates xmlns="http://schemas.microsoft.com/sharepoint/v3/contenttype/forms">
+  <Display>DocumentLibraryForm</Display>
+  <Edit>DocumentLibraryForm</Edit>
+  <New>DocumentLibraryForm</New>
+</FormTemplates>
+</file>
+
 <file path=customXml/item3.xml><?xml version="1.0" encoding="utf-8"?>
 <p:properties xmlns:p="http://schemas.microsoft.com/office/2006/metadata/properties" xmlns:xsi="http://www.w3.org/2001/XMLSchema-instance" xmlns:pc="http://schemas.microsoft.com/office/infopath/2007/PartnerControls">
   <documentManagement>
@@ -13966,14 +14358,6 @@
 </file>
 
 <file path=customXml/itemProps1.xml><?xml version="1.0" encoding="utf-8"?>
-<ds:datastoreItem xmlns:ds="http://schemas.openxmlformats.org/officeDocument/2006/customXml" ds:itemID="{E1A19B56-E7B0-46E1-9BB1-EA721CFD8B6B}">
-  <ds:schemaRefs>
-    <ds:schemaRef ds:uri="http://schemas.microsoft.com/sharepoint/v3/contenttype/forms"/>
-  </ds:schemaRefs>
-</ds:datastoreItem>
-</file>
-
-<file path=customXml/itemProps2.xml><?xml version="1.0" encoding="utf-8"?>
 <ds:datastoreItem xmlns:ds="http://schemas.openxmlformats.org/officeDocument/2006/customXml" ds:itemID="{58E6A690-D93C-40F3-BA80-B6A5375CA3C4}">
   <ds:schemaRefs>
     <ds:schemaRef ds:uri="http://schemas.microsoft.com/office/2006/metadata/contentType"/>
@@ -13992,17 +14376,25 @@
 </ds:datastoreItem>
 </file>
 
+<file path=customXml/itemProps2.xml><?xml version="1.0" encoding="utf-8"?>
+<ds:datastoreItem xmlns:ds="http://schemas.openxmlformats.org/officeDocument/2006/customXml" ds:itemID="{E1A19B56-E7B0-46E1-9BB1-EA721CFD8B6B}">
+  <ds:schemaRefs>
+    <ds:schemaRef ds:uri="http://schemas.microsoft.com/sharepoint/v3/contenttype/forms"/>
+  </ds:schemaRefs>
+</ds:datastoreItem>
+</file>
+
 <file path=customXml/itemProps3.xml><?xml version="1.0" encoding="utf-8"?>
 <ds:datastoreItem xmlns:ds="http://schemas.openxmlformats.org/officeDocument/2006/customXml" ds:itemID="{A1DE8E31-475E-4966-A1F0-BA1B686F701C}">
   <ds:schemaRefs>
-    <ds:schemaRef ds:uri="http://schemas.microsoft.com/office/infopath/2007/PartnerControls"/>
-    <ds:schemaRef ds:uri="f7f3860d-0d6f-4c7a-8485-5e6e27e7767e"/>
     <ds:schemaRef ds:uri="http://purl.org/dc/elements/1.1/"/>
     <ds:schemaRef ds:uri="http://schemas.microsoft.com/office/2006/metadata/properties"/>
     <ds:schemaRef ds:uri="c2ee7ecd-289c-457b-a16e-1307d41712cb"/>
     <ds:schemaRef ds:uri="http://purl.org/dc/terms/"/>
     <ds:schemaRef ds:uri="http://schemas.openxmlformats.org/package/2006/metadata/core-properties"/>
     <ds:schemaRef ds:uri="http://schemas.microsoft.com/office/2006/documentManagement/types"/>
+    <ds:schemaRef ds:uri="http://schemas.microsoft.com/office/infopath/2007/PartnerControls"/>
+    <ds:schemaRef ds:uri="f7f3860d-0d6f-4c7a-8485-5e6e27e7767e"/>
     <ds:schemaRef ds:uri="http://www.w3.org/XML/1998/namespace"/>
     <ds:schemaRef ds:uri="http://purl.org/dc/dcmitype/"/>
   </ds:schemaRefs>

</xml_diff>